<commit_message>
add variable importance to slides
</commit_message>
<xml_diff>
--- a/slides/matdat2018_outro.pptx
+++ b/slides/matdat2018_outro.pptx
@@ -6,7 +6,7 @@
     <p:sldMasterId id="2147483660" r:id="rId2"/>
   </p:sldMasterIdLst>
   <p:notesMasterIdLst>
-    <p:notesMasterId r:id="rId9"/>
+    <p:notesMasterId r:id="rId10"/>
   </p:notesMasterIdLst>
   <p:sldIdLst>
     <p:sldId id="261" r:id="rId3"/>
@@ -15,6 +15,7 @@
     <p:sldId id="266" r:id="rId6"/>
     <p:sldId id="267" r:id="rId7"/>
     <p:sldId id="264" r:id="rId8"/>
+    <p:sldId id="268" r:id="rId9"/>
   </p:sldIdLst>
   <p:sldSz cx="9144000" cy="6858000" type="screen4x3"/>
   <p:notesSz cx="7019925" cy="9305925"/>
@@ -7420,7 +7421,7 @@
           <a:noFill/>
           <a:extLst>
             <a:ext uri="{909E8E84-426E-40dd-AFC4-6F175D3DCCD1}">
-              <a14:hiddenFill xmlns:a14="http://schemas.microsoft.com/office/drawing/2010/main" xmlns="">
+              <a14:hiddenFill xmlns="" xmlns:a14="http://schemas.microsoft.com/office/drawing/2010/main">
                 <a:solidFill>
                   <a:srgbClr val="FFFFFF"/>
                 </a:solidFill>
@@ -8166,7 +8167,7 @@
           <a:graphicData uri="http://schemas.openxmlformats.org/presentationml/2006/ole">
             <mc:AlternateContent xmlns:mc="http://schemas.openxmlformats.org/markup-compatibility/2006">
               <mc:Choice xmlns:v="urn:schemas-microsoft-com:vml" Requires="v">
-                <p:oleObj spid="_x0000_s1089" name="Equation" r:id="rId4" imgW="1816100" imgH="495300" progId="Equation.3">
+                <p:oleObj spid="_x0000_s1095" name="Equation" r:id="rId4" imgW="1816100" imgH="495300" progId="Equation.3">
                   <p:embed/>
                 </p:oleObj>
               </mc:Choice>
@@ -8223,7 +8224,7 @@
           <a:graphicData uri="http://schemas.openxmlformats.org/presentationml/2006/ole">
             <mc:AlternateContent xmlns:mc="http://schemas.openxmlformats.org/markup-compatibility/2006">
               <mc:Choice xmlns:v="urn:schemas-microsoft-com:vml" Requires="v">
-                <p:oleObj spid="_x0000_s1090" name="Equation" r:id="rId6" imgW="1816100" imgH="495300" progId="Equation.3">
+                <p:oleObj spid="_x0000_s1096" name="Equation" r:id="rId6" imgW="1816100" imgH="495300" progId="Equation.3">
                   <p:embed/>
                 </p:oleObj>
               </mc:Choice>
@@ -8280,7 +8281,7 @@
           <a:graphicData uri="http://schemas.openxmlformats.org/presentationml/2006/ole">
             <mc:AlternateContent xmlns:mc="http://schemas.openxmlformats.org/markup-compatibility/2006">
               <mc:Choice xmlns:v="urn:schemas-microsoft-com:vml" Requires="v">
-                <p:oleObj spid="_x0000_s1091" name="Equation" r:id="rId7" imgW="1816100" imgH="495300" progId="Equation.3">
+                <p:oleObj spid="_x0000_s1097" name="Equation" r:id="rId7" imgW="1816100" imgH="495300" progId="Equation.3">
                   <p:embed/>
                 </p:oleObj>
               </mc:Choice>
@@ -8337,7 +8338,7 @@
           <a:graphicData uri="http://schemas.openxmlformats.org/presentationml/2006/ole">
             <mc:AlternateContent xmlns:mc="http://schemas.openxmlformats.org/markup-compatibility/2006">
               <mc:Choice xmlns:v="urn:schemas-microsoft-com:vml" Requires="v">
-                <p:oleObj spid="_x0000_s1092" name="Equation" r:id="rId8" imgW="1816100" imgH="495300" progId="Equation.3">
+                <p:oleObj spid="_x0000_s1098" name="Equation" r:id="rId8" imgW="1816100" imgH="495300" progId="Equation.3">
                   <p:embed/>
                 </p:oleObj>
               </mc:Choice>
@@ -8394,7 +8395,7 @@
           <a:graphicData uri="http://schemas.openxmlformats.org/presentationml/2006/ole">
             <mc:AlternateContent xmlns:mc="http://schemas.openxmlformats.org/markup-compatibility/2006">
               <mc:Choice xmlns:v="urn:schemas-microsoft-com:vml" Requires="v">
-                <p:oleObj spid="_x0000_s1093" name="Equation" r:id="rId10" imgW="1816100" imgH="495300" progId="Equation.3">
+                <p:oleObj spid="_x0000_s1099" name="Equation" r:id="rId10" imgW="1816100" imgH="495300" progId="Equation.3">
                   <p:embed/>
                 </p:oleObj>
               </mc:Choice>
@@ -8451,7 +8452,7 @@
           <a:graphicData uri="http://schemas.openxmlformats.org/presentationml/2006/ole">
             <mc:AlternateContent xmlns:mc="http://schemas.openxmlformats.org/markup-compatibility/2006">
               <mc:Choice xmlns:v="urn:schemas-microsoft-com:vml" Requires="v">
-                <p:oleObj spid="_x0000_s1094" name="Equation" r:id="rId11" imgW="1816100" imgH="495300" progId="Equation.3">
+                <p:oleObj spid="_x0000_s1100" name="Equation" r:id="rId11" imgW="1816100" imgH="495300" progId="Equation.3">
                   <p:embed/>
                 </p:oleObj>
               </mc:Choice>
@@ -9765,6 +9766,215 @@
     <p:extLst>
       <p:ext uri="{BB962C8B-B14F-4D97-AF65-F5344CB8AC3E}">
         <p14:creationId xmlns:p14="http://schemas.microsoft.com/office/powerpoint/2010/main" val="1548173751"/>
+      </p:ext>
+    </p:extLst>
+  </p:cSld>
+  <p:clrMapOvr>
+    <a:masterClrMapping/>
+  </p:clrMapOvr>
+</p:sld>
+</file>
+
+<file path=ppt/slides/slide7.xml><?xml version="1.0" encoding="utf-8"?>
+<p:sld xmlns:a="http://schemas.openxmlformats.org/drawingml/2006/main" xmlns:r="http://schemas.openxmlformats.org/officeDocument/2006/relationships" xmlns:p="http://schemas.openxmlformats.org/presentationml/2006/main">
+  <p:cSld>
+    <p:spTree>
+      <p:nvGrpSpPr>
+        <p:cNvPr id="1" name=""/>
+        <p:cNvGrpSpPr/>
+        <p:nvPr/>
+      </p:nvGrpSpPr>
+      <p:grpSpPr>
+        <a:xfrm>
+          <a:off x="0" y="0"/>
+          <a:ext cx="0" cy="0"/>
+          <a:chOff x="0" y="0"/>
+          <a:chExt cx="0" cy="0"/>
+        </a:xfrm>
+      </p:grpSpPr>
+      <p:sp>
+        <p:nvSpPr>
+          <p:cNvPr id="2" name="Title 1">
+            <a:extLst>
+              <a:ext uri="{FF2B5EF4-FFF2-40B4-BE49-F238E27FC236}">
+                <a16:creationId xmlns:a16="http://schemas.microsoft.com/office/drawing/2014/main" id="{750786F8-9C18-104E-9A65-6D681E4752BE}"/>
+              </a:ext>
+            </a:extLst>
+          </p:cNvPr>
+          <p:cNvSpPr>
+            <a:spLocks noGrp="1"/>
+          </p:cNvSpPr>
+          <p:nvPr>
+            <p:ph type="title"/>
+          </p:nvPr>
+        </p:nvSpPr>
+        <p:spPr>
+          <a:xfrm>
+            <a:off x="457200" y="-76200"/>
+            <a:ext cx="8229600" cy="715962"/>
+          </a:xfrm>
+        </p:spPr>
+        <p:txBody>
+          <a:bodyPr>
+            <a:normAutofit fontScale="90000"/>
+          </a:bodyPr>
+          <a:lstStyle/>
+          <a:p>
+            <a:r>
+              <a:rPr lang="en-US" dirty="0">
+                <a:solidFill>
+                  <a:schemeClr val="bg1"/>
+                </a:solidFill>
+              </a:rPr>
+              <a:t>Prediction Progress</a:t>
+            </a:r>
+          </a:p>
+        </p:txBody>
+      </p:sp>
+      <p:sp>
+        <p:nvSpPr>
+          <p:cNvPr id="4" name="TextBox 3">
+            <a:extLst>
+              <a:ext uri="{FF2B5EF4-FFF2-40B4-BE49-F238E27FC236}">
+                <a16:creationId xmlns:a16="http://schemas.microsoft.com/office/drawing/2014/main" id="{97BC6D74-F416-684F-B52B-33186EC5A2F4}"/>
+              </a:ext>
+            </a:extLst>
+          </p:cNvPr>
+          <p:cNvSpPr txBox="1"/>
+          <p:nvPr/>
+        </p:nvSpPr>
+        <p:spPr>
+          <a:xfrm>
+            <a:off x="228600" y="997974"/>
+            <a:ext cx="3657600" cy="4801314"/>
+          </a:xfrm>
+          <a:prstGeom prst="rect">
+            <a:avLst/>
+          </a:prstGeom>
+          <a:noFill/>
+        </p:spPr>
+        <p:txBody>
+          <a:bodyPr wrap="square" rtlCol="0">
+            <a:spAutoFit/>
+          </a:bodyPr>
+          <a:lstStyle/>
+          <a:p>
+            <a:pPr marL="342900" indent="-342900">
+              <a:buFont typeface="Arial" panose="020B0604020202020204" pitchFamily="34" charset="0"/>
+              <a:buChar char="•"/>
+            </a:pPr>
+            <a:r>
+              <a:rPr lang="en-US" sz="2400" dirty="0"/>
+              <a:t>Random forests outperformed</a:t>
+            </a:r>
+          </a:p>
+          <a:p>
+            <a:pPr marL="342900" indent="-342900">
+              <a:buFont typeface="Arial" panose="020B0604020202020204" pitchFamily="34" charset="0"/>
+              <a:buChar char="•"/>
+            </a:pPr>
+            <a:endParaRPr lang="en-US" sz="2400" dirty="0"/>
+          </a:p>
+          <a:p>
+            <a:pPr marL="742950" lvl="1" indent="-285750">
+              <a:buFont typeface="Arial" panose="020B0604020202020204" pitchFamily="34" charset="0"/>
+              <a:buChar char="•"/>
+            </a:pPr>
+            <a:r>
+              <a:rPr lang="en-US" sz="2400" dirty="0"/>
+              <a:t>Neural nets</a:t>
+            </a:r>
+          </a:p>
+          <a:p>
+            <a:pPr marL="742950" lvl="1" indent="-285750">
+              <a:buFont typeface="Arial" panose="020B0604020202020204" pitchFamily="34" charset="0"/>
+              <a:buChar char="•"/>
+            </a:pPr>
+            <a:endParaRPr lang="en-US" sz="2400" dirty="0"/>
+          </a:p>
+          <a:p>
+            <a:pPr marL="742950" lvl="1" indent="-285750">
+              <a:buFont typeface="Arial" panose="020B0604020202020204" pitchFamily="34" charset="0"/>
+              <a:buChar char="•"/>
+            </a:pPr>
+            <a:r>
+              <a:rPr lang="en-US" sz="2400" dirty="0"/>
+              <a:t>Linear models (splines, regression,…)</a:t>
+            </a:r>
+          </a:p>
+          <a:p>
+            <a:pPr marL="742950" lvl="1" indent="-285750">
+              <a:buFont typeface="Arial" panose="020B0604020202020204" pitchFamily="34" charset="0"/>
+              <a:buChar char="•"/>
+            </a:pPr>
+            <a:endParaRPr lang="en-US" sz="2400" dirty="0"/>
+          </a:p>
+          <a:p>
+            <a:pPr marL="742950" lvl="1" indent="-285750">
+              <a:buFont typeface="Arial" panose="020B0604020202020204" pitchFamily="34" charset="0"/>
+              <a:buChar char="•"/>
+            </a:pPr>
+            <a:r>
+              <a:rPr lang="en-US" sz="2400" dirty="0"/>
+              <a:t>Kernel based methods</a:t>
+            </a:r>
+          </a:p>
+          <a:p>
+            <a:pPr marL="742950" lvl="1" indent="-285750">
+              <a:buFont typeface="Arial" panose="020B0604020202020204" pitchFamily="34" charset="0"/>
+              <a:buChar char="•"/>
+            </a:pPr>
+            <a:endParaRPr lang="en-US" sz="2400" dirty="0"/>
+          </a:p>
+          <a:p>
+            <a:pPr marL="742950" lvl="1" indent="-285750">
+              <a:buFont typeface="Arial" panose="020B0604020202020204" pitchFamily="34" charset="0"/>
+              <a:buChar char="•"/>
+            </a:pPr>
+            <a:endParaRPr lang="en-US" dirty="0"/>
+          </a:p>
+        </p:txBody>
+      </p:sp>
+      <p:pic>
+        <p:nvPicPr>
+          <p:cNvPr id="6" name="Picture 5">
+            <a:extLst>
+              <a:ext uri="{FF2B5EF4-FFF2-40B4-BE49-F238E27FC236}">
+                <a16:creationId xmlns:a16="http://schemas.microsoft.com/office/drawing/2014/main" id="{4DA52556-4AD3-A142-99E6-7010DDB86C88}"/>
+              </a:ext>
+            </a:extLst>
+          </p:cNvPr>
+          <p:cNvPicPr>
+            <a:picLocks noChangeAspect="1"/>
+          </p:cNvPicPr>
+          <p:nvPr/>
+        </p:nvPicPr>
+        <p:blipFill>
+          <a:blip r:embed="rId2">
+            <a:extLst>
+              <a:ext uri="{28A0092B-C50C-407E-A947-70E740481C1C}">
+                <a14:useLocalDpi xmlns:a14="http://schemas.microsoft.com/office/drawing/2010/main" val="0"/>
+              </a:ext>
+            </a:extLst>
+          </a:blip>
+          <a:stretch>
+            <a:fillRect/>
+          </a:stretch>
+        </p:blipFill>
+        <p:spPr>
+          <a:xfrm>
+            <a:off x="2895600" y="1295400"/>
+            <a:ext cx="6198763" cy="4427688"/>
+          </a:xfrm>
+          <a:prstGeom prst="rect">
+            <a:avLst/>
+          </a:prstGeom>
+        </p:spPr>
+      </p:pic>
+    </p:spTree>
+    <p:extLst>
+      <p:ext uri="{BB962C8B-B14F-4D97-AF65-F5344CB8AC3E}">
+        <p14:creationId xmlns:p14="http://schemas.microsoft.com/office/powerpoint/2010/main" val="1538507257"/>
       </p:ext>
     </p:extLst>
   </p:cSld>

</xml_diff>

<commit_message>
Layout modification to outro slides
</commit_message>
<xml_diff>
--- a/slides/matdat2018_outro.pptx
+++ b/slides/matdat2018_outro.pptx
@@ -116,7 +116,7 @@
   </p:defaultTextStyle>
   <p:extLst>
     <p:ext uri="{EFAFB233-063F-42B5-8137-9DF3F51BA10A}">
-      <p15:sldGuideLst xmlns:p15="http://schemas.microsoft.com/office/powerpoint/2012/main">
+      <p15:sldGuideLst xmlns:p15="http://schemas.microsoft.com/office/powerpoint/2012/main" xmlns="">
         <p15:guide id="1" orient="horz" pos="2160">
           <p15:clr>
             <a:srgbClr val="A4A3A4"/>
@@ -1015,6 +1015,13 @@
         </dgm:presLayoutVars>
       </dgm:prSet>
       <dgm:spPr/>
+      <dgm:t>
+        <a:bodyPr/>
+        <a:lstStyle/>
+        <a:p>
+          <a:endParaRPr lang="en-US"/>
+        </a:p>
+      </dgm:t>
     </dgm:pt>
     <dgm:pt modelId="{994CC6A0-C878-2442-850B-4C0B02E139F6}" type="pres">
       <dgm:prSet presAssocID="{6B6B8A28-04E8-6742-8627-BFBCD73E95F7}" presName="node" presStyleLbl="node1" presStyleIdx="0" presStyleCnt="3">
@@ -1023,14 +1030,35 @@
         </dgm:presLayoutVars>
       </dgm:prSet>
       <dgm:spPr/>
+      <dgm:t>
+        <a:bodyPr/>
+        <a:lstStyle/>
+        <a:p>
+          <a:endParaRPr lang="en-US"/>
+        </a:p>
+      </dgm:t>
     </dgm:pt>
     <dgm:pt modelId="{9F7E2C77-B455-CD4B-B557-3967C315DB97}" type="pres">
       <dgm:prSet presAssocID="{5CEC5E89-997B-5B46-9A8C-0AC201F1F7B3}" presName="sibTrans" presStyleLbl="sibTrans2D1" presStyleIdx="0" presStyleCnt="2"/>
       <dgm:spPr/>
+      <dgm:t>
+        <a:bodyPr/>
+        <a:lstStyle/>
+        <a:p>
+          <a:endParaRPr lang="en-US"/>
+        </a:p>
+      </dgm:t>
     </dgm:pt>
     <dgm:pt modelId="{0FAC58B4-0E9D-B546-B397-C9FFDADCC009}" type="pres">
       <dgm:prSet presAssocID="{5CEC5E89-997B-5B46-9A8C-0AC201F1F7B3}" presName="connectorText" presStyleLbl="sibTrans2D1" presStyleIdx="0" presStyleCnt="2"/>
       <dgm:spPr/>
+      <dgm:t>
+        <a:bodyPr/>
+        <a:lstStyle/>
+        <a:p>
+          <a:endParaRPr lang="en-US"/>
+        </a:p>
+      </dgm:t>
     </dgm:pt>
     <dgm:pt modelId="{EF00A253-C979-394D-BA7A-F910BC73D679}" type="pres">
       <dgm:prSet presAssocID="{E1031E90-1433-434F-9061-29F715867368}" presName="node" presStyleLbl="node1" presStyleIdx="1" presStyleCnt="3">
@@ -1039,14 +1067,35 @@
         </dgm:presLayoutVars>
       </dgm:prSet>
       <dgm:spPr/>
+      <dgm:t>
+        <a:bodyPr/>
+        <a:lstStyle/>
+        <a:p>
+          <a:endParaRPr lang="en-US"/>
+        </a:p>
+      </dgm:t>
     </dgm:pt>
     <dgm:pt modelId="{6E28BF42-28BE-8441-B21C-F4F65A1BCF81}" type="pres">
       <dgm:prSet presAssocID="{7299AD8A-3BDF-FE41-A921-8A3484CECC03}" presName="sibTrans" presStyleLbl="sibTrans2D1" presStyleIdx="1" presStyleCnt="2"/>
       <dgm:spPr/>
+      <dgm:t>
+        <a:bodyPr/>
+        <a:lstStyle/>
+        <a:p>
+          <a:endParaRPr lang="en-US"/>
+        </a:p>
+      </dgm:t>
     </dgm:pt>
     <dgm:pt modelId="{C260C4F4-1573-5642-8717-76D7A41525C7}" type="pres">
       <dgm:prSet presAssocID="{7299AD8A-3BDF-FE41-A921-8A3484CECC03}" presName="connectorText" presStyleLbl="sibTrans2D1" presStyleIdx="1" presStyleCnt="2"/>
       <dgm:spPr/>
+      <dgm:t>
+        <a:bodyPr/>
+        <a:lstStyle/>
+        <a:p>
+          <a:endParaRPr lang="en-US"/>
+        </a:p>
+      </dgm:t>
     </dgm:pt>
     <dgm:pt modelId="{9A0C86AC-4396-9F4B-9741-2E5AEEE7CA91}" type="pres">
       <dgm:prSet presAssocID="{377BB7E9-4327-5C4E-9086-4941B53B1637}" presName="node" presStyleLbl="node1" presStyleIdx="2" presStyleCnt="3">
@@ -1055,20 +1104,27 @@
         </dgm:presLayoutVars>
       </dgm:prSet>
       <dgm:spPr/>
+      <dgm:t>
+        <a:bodyPr/>
+        <a:lstStyle/>
+        <a:p>
+          <a:endParaRPr lang="en-US"/>
+        </a:p>
+      </dgm:t>
     </dgm:pt>
   </dgm:ptLst>
   <dgm:cxnLst>
+    <dgm:cxn modelId="{044631F0-EC4A-184B-8302-E303E7350DE4}" type="presOf" srcId="{6B6B8A28-04E8-6742-8627-BFBCD73E95F7}" destId="{994CC6A0-C878-2442-850B-4C0B02E139F6}" srcOrd="0" destOrd="0" presId="urn:microsoft.com/office/officeart/2005/8/layout/process1"/>
+    <dgm:cxn modelId="{123C1683-7C0E-B440-8C53-811F28FCC979}" srcId="{96D170CE-8276-D049-BC2B-DD8C5E736981}" destId="{6B6B8A28-04E8-6742-8627-BFBCD73E95F7}" srcOrd="0" destOrd="0" parTransId="{452437FA-DA3A-C742-A4B2-93B5FBC91B72}" sibTransId="{5CEC5E89-997B-5B46-9A8C-0AC201F1F7B3}"/>
+    <dgm:cxn modelId="{FA7E2B2F-8D2E-9845-9241-97DD1B5668A8}" type="presOf" srcId="{96D170CE-8276-D049-BC2B-DD8C5E736981}" destId="{2CC9A67C-89A6-0548-BD9A-172DCEDBA72F}" srcOrd="0" destOrd="0" presId="urn:microsoft.com/office/officeart/2005/8/layout/process1"/>
+    <dgm:cxn modelId="{D8B24180-ECE5-3A4F-85D8-F1477A039348}" type="presOf" srcId="{7299AD8A-3BDF-FE41-A921-8A3484CECC03}" destId="{6E28BF42-28BE-8441-B21C-F4F65A1BCF81}" srcOrd="0" destOrd="0" presId="urn:microsoft.com/office/officeart/2005/8/layout/process1"/>
+    <dgm:cxn modelId="{CBF1B0A8-9B23-9749-B74F-958A28F5E577}" type="presOf" srcId="{5CEC5E89-997B-5B46-9A8C-0AC201F1F7B3}" destId="{0FAC58B4-0E9D-B546-B397-C9FFDADCC009}" srcOrd="1" destOrd="0" presId="urn:microsoft.com/office/officeart/2005/8/layout/process1"/>
+    <dgm:cxn modelId="{97FF5B35-7D11-7143-8673-78EBB67ADCBE}" type="presOf" srcId="{377BB7E9-4327-5C4E-9086-4941B53B1637}" destId="{9A0C86AC-4396-9F4B-9741-2E5AEEE7CA91}" srcOrd="0" destOrd="0" presId="urn:microsoft.com/office/officeart/2005/8/layout/process1"/>
     <dgm:cxn modelId="{8A1E3B0D-DC55-BF46-A201-F2146772995A}" type="presOf" srcId="{7299AD8A-3BDF-FE41-A921-8A3484CECC03}" destId="{C260C4F4-1573-5642-8717-76D7A41525C7}" srcOrd="1" destOrd="0" presId="urn:microsoft.com/office/officeart/2005/8/layout/process1"/>
+    <dgm:cxn modelId="{CC97717C-266F-164E-B0A7-1F455E56E33A}" type="presOf" srcId="{5CEC5E89-997B-5B46-9A8C-0AC201F1F7B3}" destId="{9F7E2C77-B455-CD4B-B557-3967C315DB97}" srcOrd="0" destOrd="0" presId="urn:microsoft.com/office/officeart/2005/8/layout/process1"/>
+    <dgm:cxn modelId="{F3570F9A-7D74-EE47-ABC4-BAE0C43FA924}" srcId="{96D170CE-8276-D049-BC2B-DD8C5E736981}" destId="{E1031E90-1433-434F-9061-29F715867368}" srcOrd="1" destOrd="0" parTransId="{249DAD69-EED2-FF4D-8633-7E562DCED6BC}" sibTransId="{7299AD8A-3BDF-FE41-A921-8A3484CECC03}"/>
     <dgm:cxn modelId="{F8934B1F-64C3-CC4F-ADE3-88167F8B59FE}" type="presOf" srcId="{E1031E90-1433-434F-9061-29F715867368}" destId="{EF00A253-C979-394D-BA7A-F910BC73D679}" srcOrd="0" destOrd="0" presId="urn:microsoft.com/office/officeart/2005/8/layout/process1"/>
-    <dgm:cxn modelId="{FA7E2B2F-8D2E-9845-9241-97DD1B5668A8}" type="presOf" srcId="{96D170CE-8276-D049-BC2B-DD8C5E736981}" destId="{2CC9A67C-89A6-0548-BD9A-172DCEDBA72F}" srcOrd="0" destOrd="0" presId="urn:microsoft.com/office/officeart/2005/8/layout/process1"/>
-    <dgm:cxn modelId="{97FF5B35-7D11-7143-8673-78EBB67ADCBE}" type="presOf" srcId="{377BB7E9-4327-5C4E-9086-4941B53B1637}" destId="{9A0C86AC-4396-9F4B-9741-2E5AEEE7CA91}" srcOrd="0" destOrd="0" presId="urn:microsoft.com/office/officeart/2005/8/layout/process1"/>
-    <dgm:cxn modelId="{CC97717C-266F-164E-B0A7-1F455E56E33A}" type="presOf" srcId="{5CEC5E89-997B-5B46-9A8C-0AC201F1F7B3}" destId="{9F7E2C77-B455-CD4B-B557-3967C315DB97}" srcOrd="0" destOrd="0" presId="urn:microsoft.com/office/officeart/2005/8/layout/process1"/>
-    <dgm:cxn modelId="{D8B24180-ECE5-3A4F-85D8-F1477A039348}" type="presOf" srcId="{7299AD8A-3BDF-FE41-A921-8A3484CECC03}" destId="{6E28BF42-28BE-8441-B21C-F4F65A1BCF81}" srcOrd="0" destOrd="0" presId="urn:microsoft.com/office/officeart/2005/8/layout/process1"/>
-    <dgm:cxn modelId="{123C1683-7C0E-B440-8C53-811F28FCC979}" srcId="{96D170CE-8276-D049-BC2B-DD8C5E736981}" destId="{6B6B8A28-04E8-6742-8627-BFBCD73E95F7}" srcOrd="0" destOrd="0" parTransId="{452437FA-DA3A-C742-A4B2-93B5FBC91B72}" sibTransId="{5CEC5E89-997B-5B46-9A8C-0AC201F1F7B3}"/>
-    <dgm:cxn modelId="{F3570F9A-7D74-EE47-ABC4-BAE0C43FA924}" srcId="{96D170CE-8276-D049-BC2B-DD8C5E736981}" destId="{E1031E90-1433-434F-9061-29F715867368}" srcOrd="1" destOrd="0" parTransId="{249DAD69-EED2-FF4D-8633-7E562DCED6BC}" sibTransId="{7299AD8A-3BDF-FE41-A921-8A3484CECC03}"/>
-    <dgm:cxn modelId="{CBF1B0A8-9B23-9749-B74F-958A28F5E577}" type="presOf" srcId="{5CEC5E89-997B-5B46-9A8C-0AC201F1F7B3}" destId="{0FAC58B4-0E9D-B546-B397-C9FFDADCC009}" srcOrd="1" destOrd="0" presId="urn:microsoft.com/office/officeart/2005/8/layout/process1"/>
     <dgm:cxn modelId="{D9C552D0-2CA7-1640-9AE3-584CC9D8A449}" srcId="{96D170CE-8276-D049-BC2B-DD8C5E736981}" destId="{377BB7E9-4327-5C4E-9086-4941B53B1637}" srcOrd="2" destOrd="0" parTransId="{15858850-FE69-A94D-9BD9-76DD05EDDD7C}" sibTransId="{136AA8AB-D3FA-5043-B79A-6CE9AC056719}"/>
-    <dgm:cxn modelId="{044631F0-EC4A-184B-8302-E303E7350DE4}" type="presOf" srcId="{6B6B8A28-04E8-6742-8627-BFBCD73E95F7}" destId="{994CC6A0-C878-2442-850B-4C0B02E139F6}" srcOrd="0" destOrd="0" presId="urn:microsoft.com/office/officeart/2005/8/layout/process1"/>
     <dgm:cxn modelId="{D41C1CFD-FC6A-3348-AB5E-74B1A3EE2559}" type="presParOf" srcId="{2CC9A67C-89A6-0548-BD9A-172DCEDBA72F}" destId="{994CC6A0-C878-2442-850B-4C0B02E139F6}" srcOrd="0" destOrd="0" presId="urn:microsoft.com/office/officeart/2005/8/layout/process1"/>
     <dgm:cxn modelId="{95FB458B-16AA-8348-A787-782D432B6DCB}" type="presParOf" srcId="{2CC9A67C-89A6-0548-BD9A-172DCEDBA72F}" destId="{9F7E2C77-B455-CD4B-B557-3967C315DB97}" srcOrd="1" destOrd="0" presId="urn:microsoft.com/office/officeart/2005/8/layout/process1"/>
     <dgm:cxn modelId="{9EC9CF48-F2D4-794B-947A-64CEC8D58B17}" type="presParOf" srcId="{9F7E2C77-B455-CD4B-B557-3967C315DB97}" destId="{0FAC58B4-0E9D-B546-B397-C9FFDADCC009}" srcOrd="0" destOrd="0" presId="urn:microsoft.com/office/officeart/2005/8/layout/process1"/>
@@ -1182,12 +1238,12 @@
         </a:fontRef>
       </dsp:style>
       <dsp:txBody>
-        <a:bodyPr spcFirstLastPara="0" vert="horz" wrap="square" lIns="64770" tIns="64770" rIns="64770" bIns="64770" numCol="1" spcCol="1270" anchor="ctr" anchorCtr="0">
+        <a:bodyPr spcFirstLastPara="0" vert="horz" wrap="square" lIns="76200" tIns="76200" rIns="76200" bIns="76200" numCol="1" spcCol="1270" anchor="ctr" anchorCtr="0">
           <a:noAutofit/>
         </a:bodyPr>
         <a:lstStyle/>
         <a:p>
-          <a:pPr marL="0" lvl="0" indent="0" algn="ctr" defTabSz="755650">
+          <a:pPr lvl="0" algn="ctr" defTabSz="889000">
             <a:lnSpc>
               <a:spcPct val="90000"/>
             </a:lnSpc>
@@ -1197,10 +1253,9 @@
             <a:spcAft>
               <a:spcPct val="35000"/>
             </a:spcAft>
-            <a:buNone/>
           </a:pPr>
           <a:r>
-            <a:rPr lang="en-US" sz="1700" kern="1200" dirty="0"/>
+            <a:rPr lang="en-US" sz="2000" kern="1200" dirty="0"/>
             <a:t>Select Compounds/Processing</a:t>
           </a:r>
         </a:p>
@@ -1306,7 +1361,7 @@
         </a:bodyPr>
         <a:lstStyle/>
         <a:p>
-          <a:pPr marL="0" lvl="0" indent="0" algn="ctr" defTabSz="622300">
+          <a:pPr lvl="0" algn="ctr" defTabSz="711200">
             <a:lnSpc>
               <a:spcPct val="90000"/>
             </a:lnSpc>
@@ -1316,9 +1371,8 @@
             <a:spcAft>
               <a:spcPct val="35000"/>
             </a:spcAft>
-            <a:buNone/>
           </a:pPr>
-          <a:endParaRPr lang="en-US" sz="1400" kern="1200"/>
+          <a:endParaRPr lang="en-US" sz="1600" kern="1200"/>
         </a:p>
       </dsp:txBody>
       <dsp:txXfrm>
@@ -1413,12 +1467,12 @@
         </a:fontRef>
       </dsp:style>
       <dsp:txBody>
-        <a:bodyPr spcFirstLastPara="0" vert="horz" wrap="square" lIns="64770" tIns="64770" rIns="64770" bIns="64770" numCol="1" spcCol="1270" anchor="ctr" anchorCtr="0">
+        <a:bodyPr spcFirstLastPara="0" vert="horz" wrap="square" lIns="76200" tIns="76200" rIns="76200" bIns="76200" numCol="1" spcCol="1270" anchor="ctr" anchorCtr="0">
           <a:noAutofit/>
         </a:bodyPr>
         <a:lstStyle/>
         <a:p>
-          <a:pPr marL="0" lvl="0" indent="0" algn="ctr" defTabSz="755650">
+          <a:pPr lvl="0" algn="ctr" defTabSz="889000">
             <a:lnSpc>
               <a:spcPct val="90000"/>
             </a:lnSpc>
@@ -1428,10 +1482,9 @@
             <a:spcAft>
               <a:spcPct val="35000"/>
             </a:spcAft>
-            <a:buNone/>
           </a:pPr>
           <a:r>
-            <a:rPr lang="en-US" sz="1700" kern="1200" dirty="0"/>
+            <a:rPr lang="en-US" sz="2000" kern="1200" dirty="0"/>
             <a:t>Predict Structure</a:t>
           </a:r>
         </a:p>
@@ -1537,7 +1590,7 @@
         </a:bodyPr>
         <a:lstStyle/>
         <a:p>
-          <a:pPr marL="0" lvl="0" indent="0" algn="ctr" defTabSz="622300">
+          <a:pPr lvl="0" algn="ctr" defTabSz="711200">
             <a:lnSpc>
               <a:spcPct val="90000"/>
             </a:lnSpc>
@@ -1547,9 +1600,8 @@
             <a:spcAft>
               <a:spcPct val="35000"/>
             </a:spcAft>
-            <a:buNone/>
           </a:pPr>
-          <a:endParaRPr lang="en-US" sz="1400" kern="1200"/>
+          <a:endParaRPr lang="en-US" sz="1600" kern="1200"/>
         </a:p>
       </dsp:txBody>
       <dsp:txXfrm>
@@ -1644,12 +1696,12 @@
         </a:fontRef>
       </dsp:style>
       <dsp:txBody>
-        <a:bodyPr spcFirstLastPara="0" vert="horz" wrap="square" lIns="64770" tIns="64770" rIns="64770" bIns="64770" numCol="1" spcCol="1270" anchor="ctr" anchorCtr="0">
+        <a:bodyPr spcFirstLastPara="0" vert="horz" wrap="square" lIns="76200" tIns="76200" rIns="76200" bIns="76200" numCol="1" spcCol="1270" anchor="ctr" anchorCtr="0">
           <a:noAutofit/>
         </a:bodyPr>
         <a:lstStyle/>
         <a:p>
-          <a:pPr marL="0" lvl="0" indent="0" algn="ctr" defTabSz="755650">
+          <a:pPr lvl="0" algn="ctr" defTabSz="889000">
             <a:lnSpc>
               <a:spcPct val="90000"/>
             </a:lnSpc>
@@ -1659,10 +1711,9 @@
             <a:spcAft>
               <a:spcPct val="35000"/>
             </a:spcAft>
-            <a:buNone/>
           </a:pPr>
           <a:r>
-            <a:rPr lang="en-US" sz="1700" kern="1200" dirty="0"/>
+            <a:rPr lang="en-US" sz="2000" kern="1200" dirty="0"/>
             <a:t>Calculate Electronic Properties</a:t>
           </a:r>
         </a:p>
@@ -2939,7 +2990,7 @@
             <a:fld id="{9D886DC0-0A93-42D6-A675-017B8760B41B}" type="datetimeFigureOut">
               <a:rPr lang="en-US" smtClean="0"/>
               <a:pPr/>
-              <a:t>6/1/18</a:t>
+              <a:t>6/4/18</a:t>
             </a:fld>
             <a:endParaRPr lang="en-US"/>
           </a:p>
@@ -7506,7 +7557,7 @@
           <a:noFill/>
           <a:extLst>
             <a:ext uri="{909E8E84-426E-40dd-AFC4-6F175D3DCCD1}">
-              <a14:hiddenFill xmlns="" xmlns:a14="http://schemas.microsoft.com/office/drawing/2010/main">
+              <a14:hiddenFill xmlns:a14="http://schemas.microsoft.com/office/drawing/2010/main">
                 <a:solidFill>
                   <a:srgbClr val="FFFFFF"/>
                 </a:solidFill>
@@ -8252,7 +8303,7 @@
           <a:graphicData uri="http://schemas.openxmlformats.org/presentationml/2006/ole">
             <mc:AlternateContent xmlns:mc="http://schemas.openxmlformats.org/markup-compatibility/2006">
               <mc:Choice xmlns:v="urn:schemas-microsoft-com:vml" Requires="v">
-                <p:oleObj spid="_x0000_s1125" name="Equation" r:id="rId4" imgW="1816100" imgH="495300" progId="Equation.3">
+                <p:oleObj spid="_x0000_s1132" name="Equation" r:id="rId4" imgW="1816100" imgH="495300" progId="Equation.3">
                   <p:embed/>
                 </p:oleObj>
               </mc:Choice>
@@ -8309,7 +8360,7 @@
           <a:graphicData uri="http://schemas.openxmlformats.org/presentationml/2006/ole">
             <mc:AlternateContent xmlns:mc="http://schemas.openxmlformats.org/markup-compatibility/2006">
               <mc:Choice xmlns:v="urn:schemas-microsoft-com:vml" Requires="v">
-                <p:oleObj spid="_x0000_s1126" name="Equation" r:id="rId6" imgW="1816100" imgH="495300" progId="Equation.3">
+                <p:oleObj spid="_x0000_s1133" name="Equation" r:id="rId6" imgW="1816100" imgH="495300" progId="Equation.3">
                   <p:embed/>
                 </p:oleObj>
               </mc:Choice>
@@ -8366,7 +8417,7 @@
           <a:graphicData uri="http://schemas.openxmlformats.org/presentationml/2006/ole">
             <mc:AlternateContent xmlns:mc="http://schemas.openxmlformats.org/markup-compatibility/2006">
               <mc:Choice xmlns:v="urn:schemas-microsoft-com:vml" Requires="v">
-                <p:oleObj spid="_x0000_s1127" name="Equation" r:id="rId7" imgW="1816100" imgH="495300" progId="Equation.3">
+                <p:oleObj spid="_x0000_s1134" name="Equation" r:id="rId7" imgW="1816100" imgH="495300" progId="Equation.3">
                   <p:embed/>
                 </p:oleObj>
               </mc:Choice>
@@ -8423,7 +8474,7 @@
           <a:graphicData uri="http://schemas.openxmlformats.org/presentationml/2006/ole">
             <mc:AlternateContent xmlns:mc="http://schemas.openxmlformats.org/markup-compatibility/2006">
               <mc:Choice xmlns:v="urn:schemas-microsoft-com:vml" Requires="v">
-                <p:oleObj spid="_x0000_s1128" name="Equation" r:id="rId8" imgW="1816100" imgH="495300" progId="Equation.3">
+                <p:oleObj spid="_x0000_s1135" name="Equation" r:id="rId8" imgW="1816100" imgH="495300" progId="Equation.3">
                   <p:embed/>
                 </p:oleObj>
               </mc:Choice>
@@ -8480,7 +8531,7 @@
           <a:graphicData uri="http://schemas.openxmlformats.org/presentationml/2006/ole">
             <mc:AlternateContent xmlns:mc="http://schemas.openxmlformats.org/markup-compatibility/2006">
               <mc:Choice xmlns:v="urn:schemas-microsoft-com:vml" Requires="v">
-                <p:oleObj spid="_x0000_s1129" name="Equation" r:id="rId10" imgW="1816100" imgH="495300" progId="Equation.3">
+                <p:oleObj spid="_x0000_s1136" name="Equation" r:id="rId10" imgW="1816100" imgH="495300" progId="Equation.3">
                   <p:embed/>
                 </p:oleObj>
               </mc:Choice>
@@ -8537,7 +8588,7 @@
           <a:graphicData uri="http://schemas.openxmlformats.org/presentationml/2006/ole">
             <mc:AlternateContent xmlns:mc="http://schemas.openxmlformats.org/markup-compatibility/2006">
               <mc:Choice xmlns:v="urn:schemas-microsoft-com:vml" Requires="v">
-                <p:oleObj spid="_x0000_s1130" name="Equation" r:id="rId11" imgW="1816100" imgH="495300" progId="Equation.3">
+                <p:oleObj spid="_x0000_s1137" name="Equation" r:id="rId11" imgW="1816100" imgH="495300" progId="Equation.3">
                   <p:embed/>
                 </p:oleObj>
               </mc:Choice>
@@ -9320,7 +9371,7 @@
           <p:cNvPr id="2" name="Title 1">
             <a:extLst>
               <a:ext uri="{FF2B5EF4-FFF2-40B4-BE49-F238E27FC236}">
-                <a16:creationId xmlns:a16="http://schemas.microsoft.com/office/drawing/2014/main" id="{B1C814CD-CF87-494F-8D78-7CF483DB02D2}"/>
+                <a16:creationId xmlns:a16="http://schemas.microsoft.com/office/drawing/2014/main" xmlns="" id="{B1C814CD-CF87-494F-8D78-7CF483DB02D2}"/>
               </a:ext>
             </a:extLst>
           </p:cNvPr>
@@ -9359,7 +9410,7 @@
           <p:cNvPr id="5" name="Content Placeholder 4">
             <a:extLst>
               <a:ext uri="{FF2B5EF4-FFF2-40B4-BE49-F238E27FC236}">
-                <a16:creationId xmlns:a16="http://schemas.microsoft.com/office/drawing/2014/main" id="{6287957E-EACF-1E40-BF0F-7898628B07D9}"/>
+                <a16:creationId xmlns:a16="http://schemas.microsoft.com/office/drawing/2014/main" xmlns="" id="{6287957E-EACF-1E40-BF0F-7898628B07D9}"/>
               </a:ext>
             </a:extLst>
           </p:cNvPr>
@@ -9424,7 +9475,7 @@
           <p:cNvPr id="5" name="Content Placeholder 4">
             <a:extLst>
               <a:ext uri="{FF2B5EF4-FFF2-40B4-BE49-F238E27FC236}">
-                <a16:creationId xmlns:a16="http://schemas.microsoft.com/office/drawing/2014/main" id="{9C3FBAF7-E365-954F-B866-EF97E718B337}"/>
+                <a16:creationId xmlns:a16="http://schemas.microsoft.com/office/drawing/2014/main" xmlns="" id="{9C3FBAF7-E365-954F-B866-EF97E718B337}"/>
               </a:ext>
             </a:extLst>
           </p:cNvPr>
@@ -9459,7 +9510,7 @@
           <p:cNvPr id="6" name="Title 1">
             <a:extLst>
               <a:ext uri="{FF2B5EF4-FFF2-40B4-BE49-F238E27FC236}">
-                <a16:creationId xmlns:a16="http://schemas.microsoft.com/office/drawing/2014/main" id="{2F64A2A1-6C4A-264A-89A1-CE64A4713608}"/>
+                <a16:creationId xmlns:a16="http://schemas.microsoft.com/office/drawing/2014/main" xmlns="" id="{2F64A2A1-6C4A-264A-89A1-CE64A4713608}"/>
               </a:ext>
             </a:extLst>
           </p:cNvPr>
@@ -9544,7 +9595,7 @@
           <p:cNvPr id="5" name="Content Placeholder 4">
             <a:extLst>
               <a:ext uri="{FF2B5EF4-FFF2-40B4-BE49-F238E27FC236}">
-                <a16:creationId xmlns:a16="http://schemas.microsoft.com/office/drawing/2014/main" id="{1F43AF3D-33E9-FF4C-A422-324F20B67F5F}"/>
+                <a16:creationId xmlns:a16="http://schemas.microsoft.com/office/drawing/2014/main" xmlns="" id="{1F43AF3D-33E9-FF4C-A422-324F20B67F5F}"/>
               </a:ext>
             </a:extLst>
           </p:cNvPr>
@@ -9579,7 +9630,7 @@
           <p:cNvPr id="6" name="Title 1">
             <a:extLst>
               <a:ext uri="{FF2B5EF4-FFF2-40B4-BE49-F238E27FC236}">
-                <a16:creationId xmlns:a16="http://schemas.microsoft.com/office/drawing/2014/main" id="{7E1304C8-EAC2-E344-A210-C8F9607F2BB3}"/>
+                <a16:creationId xmlns:a16="http://schemas.microsoft.com/office/drawing/2014/main" xmlns="" id="{7E1304C8-EAC2-E344-A210-C8F9607F2BB3}"/>
               </a:ext>
             </a:extLst>
           </p:cNvPr>
@@ -9664,7 +9715,7 @@
           <p:cNvPr id="2" name="Title 1">
             <a:extLst>
               <a:ext uri="{FF2B5EF4-FFF2-40B4-BE49-F238E27FC236}">
-                <a16:creationId xmlns:a16="http://schemas.microsoft.com/office/drawing/2014/main" id="{B0FFBAFB-B9B1-884A-BE72-9ED8ACC186F3}"/>
+                <a16:creationId xmlns:a16="http://schemas.microsoft.com/office/drawing/2014/main" xmlns="" id="{B0FFBAFB-B9B1-884A-BE72-9ED8ACC186F3}"/>
               </a:ext>
             </a:extLst>
           </p:cNvPr>
@@ -9703,7 +9754,7 @@
           <p:cNvPr id="5" name="Content Placeholder 4">
             <a:extLst>
               <a:ext uri="{FF2B5EF4-FFF2-40B4-BE49-F238E27FC236}">
-                <a16:creationId xmlns:a16="http://schemas.microsoft.com/office/drawing/2014/main" id="{62326D23-DA1B-1345-8130-6575B41CED30}"/>
+                <a16:creationId xmlns:a16="http://schemas.microsoft.com/office/drawing/2014/main" xmlns="" id="{62326D23-DA1B-1345-8130-6575B41CED30}"/>
               </a:ext>
             </a:extLst>
           </p:cNvPr>
@@ -9738,7 +9789,7 @@
           <p:cNvPr id="6" name="TextBox 5">
             <a:extLst>
               <a:ext uri="{FF2B5EF4-FFF2-40B4-BE49-F238E27FC236}">
-                <a16:creationId xmlns:a16="http://schemas.microsoft.com/office/drawing/2014/main" id="{F3A43265-910E-A744-8785-B7FEE76D8845}"/>
+                <a16:creationId xmlns:a16="http://schemas.microsoft.com/office/drawing/2014/main" xmlns="" id="{F3A43265-910E-A744-8785-B7FEE76D8845}"/>
               </a:ext>
             </a:extLst>
           </p:cNvPr>
@@ -9872,7 +9923,7 @@
           <p:cNvPr id="2" name="Title 1">
             <a:extLst>
               <a:ext uri="{FF2B5EF4-FFF2-40B4-BE49-F238E27FC236}">
-                <a16:creationId xmlns:a16="http://schemas.microsoft.com/office/drawing/2014/main" id="{750786F8-9C18-104E-9A65-6D681E4752BE}"/>
+                <a16:creationId xmlns:a16="http://schemas.microsoft.com/office/drawing/2014/main" xmlns="" id="{750786F8-9C18-104E-9A65-6D681E4752BE}"/>
               </a:ext>
             </a:extLst>
           </p:cNvPr>
@@ -9916,7 +9967,7 @@
           <p:cNvPr id="4" name="TextBox 3">
             <a:extLst>
               <a:ext uri="{FF2B5EF4-FFF2-40B4-BE49-F238E27FC236}">
-                <a16:creationId xmlns:a16="http://schemas.microsoft.com/office/drawing/2014/main" id="{97BC6D74-F416-684F-B52B-33186EC5A2F4}"/>
+                <a16:creationId xmlns:a16="http://schemas.microsoft.com/office/drawing/2014/main" xmlns="" id="{97BC6D74-F416-684F-B52B-33186EC5A2F4}"/>
               </a:ext>
             </a:extLst>
           </p:cNvPr>
@@ -9925,8 +9976,8 @@
         </p:nvSpPr>
         <p:spPr>
           <a:xfrm>
-            <a:off x="228600" y="997974"/>
-            <a:ext cx="3657600" cy="4801314"/>
+            <a:off x="76200" y="990600"/>
+            <a:ext cx="2895600" cy="4801314"/>
           </a:xfrm>
           <a:prstGeom prst="rect">
             <a:avLst/>
@@ -10020,7 +10071,7 @@
           <p:cNvPr id="6" name="Picture 5">
             <a:extLst>
               <a:ext uri="{FF2B5EF4-FFF2-40B4-BE49-F238E27FC236}">
-                <a16:creationId xmlns:a16="http://schemas.microsoft.com/office/drawing/2014/main" id="{4DA52556-4AD3-A142-99E6-7010DDB86C88}"/>
+                <a16:creationId xmlns:a16="http://schemas.microsoft.com/office/drawing/2014/main" xmlns="" id="{4DA52556-4AD3-A142-99E6-7010DDB86C88}"/>
               </a:ext>
             </a:extLst>
           </p:cNvPr>
@@ -10346,7 +10397,7 @@
   <a:extraClrSchemeLst/>
   <a:extLst>
     <a:ext uri="{05A4C25C-085E-4340-85A3-A5531E510DB2}">
-      <thm15:themeFamily xmlns:thm15="http://schemas.microsoft.com/office/thememl/2012/main" name="Presentation1" id="{4E82199B-DC72-488A-95B8-89E8CD66E9DD}" vid="{A67F7EB3-B12E-4EFB-B5BD-71C286836255}"/>
+      <thm15:themeFamily xmlns:thm15="http://schemas.microsoft.com/office/thememl/2012/main" xmlns="" name="Presentation1" id="{4E82199B-DC72-488A-95B8-89E8CD66E9DD}" vid="{A67F7EB3-B12E-4EFB-B5BD-71C286836255}"/>
     </a:ext>
   </a:extLst>
 </a:theme>
@@ -10634,7 +10685,7 @@
   <a:extraClrSchemeLst/>
   <a:extLst>
     <a:ext uri="{05A4C25C-085E-4340-85A3-A5531E510DB2}">
-      <thm15:themeFamily xmlns:thm15="http://schemas.microsoft.com/office/thememl/2012/main" name="Presentation1" id="{4E82199B-DC72-488A-95B8-89E8CD66E9DD}" vid="{4EF0FCDD-25EB-4093-B50D-713D10A174B7}"/>
+      <thm15:themeFamily xmlns:thm15="http://schemas.microsoft.com/office/thememl/2012/main" xmlns="" name="Presentation1" id="{4E82199B-DC72-488A-95B8-89E8CD66E9DD}" vid="{4EF0FCDD-25EB-4093-B50D-713D10A174B7}"/>
     </a:ext>
   </a:extLst>
 </a:theme>

</xml_diff>